<commit_message>
Minor fixes on design patterns slides
</commit_message>
<xml_diff>
--- a/Courses/Software-Sciences/Module-1-OOP/14-Design-Patterns/14-Design-Patterns.pptx
+++ b/Courses/Software-Sciences/Module-1-OOP/14-Design-Patterns/14-Design-Patterns.pptx
@@ -308,7 +308,7 @@
             </a:lvl1pPr>
           </a:lstStyle>
           <a:p>
-            <a:endParaRPr lang="bg-BG"/>
+            <a:endParaRPr lang="bg-BG" dirty="0"/>
           </a:p>
         </p:txBody>
       </p:sp>
@@ -347,9 +347,9 @@
           <a:p>
             <a:fld id="{4E087215-0C8F-4762-A664-737A353EC9A4}" type="datetimeFigureOut">
               <a:rPr lang="bg-BG" smtClean="0"/>
-              <a:t>18.01.23 г.</a:t>
+              <a:t>17.05.23 г.</a:t>
             </a:fld>
-            <a:endParaRPr lang="bg-BG"/>
+            <a:endParaRPr lang="bg-BG" dirty="0"/>
           </a:p>
         </p:txBody>
       </p:sp>
@@ -505,7 +505,7 @@
             </a:lvl1pPr>
           </a:lstStyle>
           <a:p>
-            <a:endParaRPr lang="en-US"/>
+            <a:endParaRPr lang="en-US" dirty="0"/>
           </a:p>
         </p:txBody>
       </p:sp>
@@ -538,9 +538,9 @@
           <a:p>
             <a:fld id="{72D84649-876A-46C9-8472-14CB09C070D8}" type="datetimeFigureOut">
               <a:rPr lang="en-US" smtClean="0"/>
-              <a:t>1/18/23</a:t>
+              <a:t>5/17/23</a:t>
             </a:fld>
-            <a:endParaRPr lang="en-US"/>
+            <a:endParaRPr lang="en-US" dirty="0"/>
           </a:p>
         </p:txBody>
       </p:sp>
@@ -573,7 +573,7 @@
           <a:bodyPr vert="horz" lIns="91440" tIns="45720" rIns="91440" bIns="45720" rtlCol="0" anchor="ctr"/>
           <a:lstStyle/>
           <a:p>
-            <a:endParaRPr lang="en-US"/>
+            <a:endParaRPr lang="en-US" dirty="0"/>
           </a:p>
         </p:txBody>
       </p:sp>
@@ -1004,7 +1004,7 @@
           <a:bodyPr/>
           <a:lstStyle/>
           <a:p>
-            <a:endParaRPr lang="en-BG" dirty="0"/>
+            <a:endParaRPr lang="en-BG"/>
           </a:p>
         </p:txBody>
       </p:sp>
@@ -1047,20 +1047,19 @@
           <a:lstStyle/>
           <a:p>
             <a:r>
-              <a:rPr lang="en-US"/>
+              <a:rPr lang="en-US" dirty="0"/>
               <a:t>© SoftUni – </a:t>
             </a:r>
             <a:r>
-              <a:rPr lang="en-US" u="sng">
+              <a:rPr lang="en-US" u="sng" dirty="0">
                 <a:hlinkClick r:id="rId3"/>
               </a:rPr>
               <a:t>https://softuni.org</a:t>
             </a:r>
             <a:r>
-              <a:rPr lang="en-US"/>
+              <a:rPr lang="en-US" dirty="0"/>
               <a:t>. Copyrighted document. Unauthorized copy or reproduction is not permitted.</a:t>
             </a:r>
-            <a:endParaRPr lang="en-US" dirty="0"/>
           </a:p>
         </p:txBody>
       </p:sp>
@@ -1121,7 +1120,7 @@
           <a:bodyPr/>
           <a:lstStyle/>
           <a:p>
-            <a:endParaRPr lang="en-BG" dirty="0"/>
+            <a:endParaRPr lang="en-BG"/>
           </a:p>
         </p:txBody>
       </p:sp>
@@ -1164,20 +1163,19 @@
           <a:lstStyle/>
           <a:p>
             <a:r>
-              <a:rPr lang="en-US"/>
+              <a:rPr lang="en-US" dirty="0"/>
               <a:t>© SoftUni – </a:t>
             </a:r>
             <a:r>
-              <a:rPr lang="en-US" u="sng">
+              <a:rPr lang="en-US" u="sng" dirty="0">
                 <a:hlinkClick r:id="rId3"/>
               </a:rPr>
               <a:t>https://softuni.org</a:t>
             </a:r>
             <a:r>
-              <a:rPr lang="en-US"/>
+              <a:rPr lang="en-US" dirty="0"/>
               <a:t>. Copyrighted document. Unauthorized copy or reproduction is not permitted.</a:t>
             </a:r>
-            <a:endParaRPr lang="en-US" dirty="0"/>
           </a:p>
         </p:txBody>
       </p:sp>
@@ -1373,7 +1371,7 @@
           <a:bodyPr/>
           <a:lstStyle/>
           <a:p>
-            <a:endParaRPr lang="en-BG" dirty="0"/>
+            <a:endParaRPr lang="en-BG"/>
           </a:p>
         </p:txBody>
       </p:sp>
@@ -1416,20 +1414,19 @@
           <a:lstStyle/>
           <a:p>
             <a:r>
-              <a:rPr lang="en-US"/>
+              <a:rPr lang="en-US" dirty="0"/>
               <a:t>© SoftUni – </a:t>
             </a:r>
             <a:r>
-              <a:rPr lang="en-US" u="sng">
+              <a:rPr lang="en-US" u="sng" dirty="0">
                 <a:hlinkClick r:id="rId3"/>
               </a:rPr>
               <a:t>https://softuni.org</a:t>
             </a:r>
             <a:r>
-              <a:rPr lang="en-US"/>
+              <a:rPr lang="en-US" dirty="0"/>
               <a:t>. Copyrighted document. Unauthorized copy or reproduction is not permitted.</a:t>
             </a:r>
-            <a:endParaRPr lang="en-US" dirty="0"/>
           </a:p>
         </p:txBody>
       </p:sp>
@@ -1490,7 +1487,7 @@
           <a:bodyPr/>
           <a:lstStyle/>
           <a:p>
-            <a:endParaRPr lang="en-BG" dirty="0"/>
+            <a:endParaRPr lang="en-BG"/>
           </a:p>
         </p:txBody>
       </p:sp>
@@ -1533,20 +1530,19 @@
           <a:lstStyle/>
           <a:p>
             <a:r>
-              <a:rPr lang="en-US"/>
+              <a:rPr lang="en-US" dirty="0"/>
               <a:t>© SoftUni – </a:t>
             </a:r>
             <a:r>
-              <a:rPr lang="en-US" u="sng">
+              <a:rPr lang="en-US" u="sng" dirty="0">
                 <a:hlinkClick r:id="rId3"/>
               </a:rPr>
               <a:t>https://softuni.org</a:t>
             </a:r>
             <a:r>
-              <a:rPr lang="en-US"/>
+              <a:rPr lang="en-US" dirty="0"/>
               <a:t>. Copyrighted document. Unauthorized copy or reproduction is not permitted.</a:t>
             </a:r>
-            <a:endParaRPr lang="en-US" dirty="0"/>
           </a:p>
         </p:txBody>
       </p:sp>
@@ -1983,7 +1979,7 @@
           <a:bodyPr/>
           <a:lstStyle/>
           <a:p>
-            <a:endParaRPr lang="en-US"/>
+            <a:endParaRPr lang="en-US" dirty="0"/>
           </a:p>
         </p:txBody>
       </p:sp>
@@ -2494,7 +2490,7 @@
           <a:bodyPr/>
           <a:lstStyle/>
           <a:p>
-            <a:endParaRPr lang="en-BG" dirty="0"/>
+            <a:endParaRPr lang="en-BG"/>
           </a:p>
         </p:txBody>
       </p:sp>
@@ -2537,20 +2533,19 @@
           <a:lstStyle/>
           <a:p>
             <a:r>
-              <a:rPr lang="en-US"/>
+              <a:rPr lang="en-US" dirty="0"/>
               <a:t>© SoftUni – </a:t>
             </a:r>
             <a:r>
-              <a:rPr lang="en-US" u="sng">
+              <a:rPr lang="en-US" u="sng" dirty="0">
                 <a:hlinkClick r:id="rId3"/>
               </a:rPr>
               <a:t>https://softuni.org</a:t>
             </a:r>
             <a:r>
-              <a:rPr lang="en-US"/>
+              <a:rPr lang="en-US" dirty="0"/>
               <a:t>. Copyrighted document. Unauthorized copy or reproduction is not permitted.</a:t>
             </a:r>
-            <a:endParaRPr lang="en-US" dirty="0"/>
           </a:p>
         </p:txBody>
       </p:sp>
@@ -2611,7 +2606,7 @@
           <a:bodyPr/>
           <a:lstStyle/>
           <a:p>
-            <a:endParaRPr lang="en-BG" dirty="0"/>
+            <a:endParaRPr lang="en-BG"/>
           </a:p>
         </p:txBody>
       </p:sp>
@@ -2654,20 +2649,19 @@
           <a:lstStyle/>
           <a:p>
             <a:r>
-              <a:rPr lang="en-US"/>
+              <a:rPr lang="en-US" dirty="0"/>
               <a:t>© SoftUni – </a:t>
             </a:r>
             <a:r>
-              <a:rPr lang="en-US" u="sng">
+              <a:rPr lang="en-US" u="sng" dirty="0">
                 <a:hlinkClick r:id="rId3"/>
               </a:rPr>
               <a:t>https://softuni.org</a:t>
             </a:r>
             <a:r>
-              <a:rPr lang="en-US"/>
+              <a:rPr lang="en-US" dirty="0"/>
               <a:t>. Copyrighted document. Unauthorized copy or reproduction is not permitted.</a:t>
             </a:r>
-            <a:endParaRPr lang="en-US" dirty="0"/>
           </a:p>
         </p:txBody>
       </p:sp>
@@ -2998,7 +2992,7 @@
           <a:bodyPr/>
           <a:lstStyle/>
           <a:p>
-            <a:endParaRPr lang="en-BG" dirty="0"/>
+            <a:endParaRPr lang="en-BG"/>
           </a:p>
         </p:txBody>
       </p:sp>
@@ -3041,20 +3035,19 @@
           <a:lstStyle/>
           <a:p>
             <a:r>
-              <a:rPr lang="en-US"/>
+              <a:rPr lang="en-US" dirty="0"/>
               <a:t>© SoftUni – </a:t>
             </a:r>
             <a:r>
-              <a:rPr lang="en-US" u="sng">
+              <a:rPr lang="en-US" u="sng" dirty="0">
                 <a:hlinkClick r:id="rId3"/>
               </a:rPr>
               <a:t>https://softuni.org</a:t>
             </a:r>
             <a:r>
-              <a:rPr lang="en-US"/>
+              <a:rPr lang="en-US" dirty="0"/>
               <a:t>. Copyrighted document. Unauthorized copy or reproduction is not permitted.</a:t>
             </a:r>
-            <a:endParaRPr lang="en-US" dirty="0"/>
           </a:p>
         </p:txBody>
       </p:sp>
@@ -3287,7 +3280,7 @@
               <a:tabLst/>
               <a:defRPr/>
             </a:pPr>
-            <a:endParaRPr kumimoji="0" lang="en-US" altLang="ko-KR" sz="2398" b="0" i="0" u="none" strike="noStrike" kern="1200" cap="none" spc="0" normalizeH="0" baseline="0" noProof="0">
+            <a:endParaRPr kumimoji="0" lang="en-US" altLang="ko-KR" sz="2398" b="0" i="0" u="none" strike="noStrike" kern="1200" cap="none" spc="0" normalizeH="0" baseline="0" noProof="0" dirty="0">
               <a:ln>
                 <a:noFill/>
               </a:ln>
@@ -3916,7 +3909,7 @@
               <a:tabLst/>
               <a:defRPr/>
             </a:pPr>
-            <a:endParaRPr kumimoji="0" lang="en-US" altLang="ko-KR" sz="2398" b="0" i="0" u="none" strike="noStrike" kern="1200" cap="none" spc="0" normalizeH="0" baseline="0" noProof="0">
+            <a:endParaRPr kumimoji="0" lang="en-US" altLang="ko-KR" sz="2398" b="0" i="0" u="none" strike="noStrike" kern="1200" cap="none" spc="0" normalizeH="0" baseline="0" noProof="0" dirty="0">
               <a:ln>
                 <a:noFill/>
               </a:ln>
@@ -4039,7 +4032,7 @@
               <a:tabLst/>
               <a:defRPr/>
             </a:pPr>
-            <a:endParaRPr kumimoji="0" lang="en-US" altLang="ko-KR" sz="2398" b="0" i="0" u="none" strike="noStrike" kern="1200" cap="none" spc="0" normalizeH="0" baseline="0" noProof="0">
+            <a:endParaRPr kumimoji="0" lang="en-US" altLang="ko-KR" sz="2398" b="0" i="0" u="none" strike="noStrike" kern="1200" cap="none" spc="0" normalizeH="0" baseline="0" noProof="0" dirty="0">
               <a:ln>
                 <a:noFill/>
               </a:ln>
@@ -4312,7 +4305,7 @@
               <a:tabLst/>
               <a:defRPr/>
             </a:pPr>
-            <a:endParaRPr kumimoji="0" lang="en-US" altLang="ko-KR" sz="2398" b="0" i="0" u="none" strike="noStrike" kern="1200" cap="none" spc="0" normalizeH="0" baseline="0" noProof="0">
+            <a:endParaRPr kumimoji="0" lang="en-US" altLang="ko-KR" sz="2398" b="0" i="0" u="none" strike="noStrike" kern="1200" cap="none" spc="0" normalizeH="0" baseline="0" noProof="0" dirty="0">
               <a:ln>
                 <a:noFill/>
               </a:ln>
@@ -4498,7 +4491,7 @@
               <a:pPr/>
               <a:t>‹#›</a:t>
             </a:fld>
-            <a:endParaRPr lang="en-US" noProof="0"/>
+            <a:endParaRPr lang="en-US" noProof="0" dirty="0"/>
           </a:p>
         </p:txBody>
       </p:sp>
@@ -4652,7 +4645,7 @@
           </a:lstStyle>
           <a:p>
             <a:r>
-              <a:rPr lang="en-US" altLang="ko-KR" noProof="0"/>
+              <a:rPr lang="en-US" altLang="ko-KR" noProof="0" dirty="0"/>
               <a:t>Your Picture Here</a:t>
             </a:r>
           </a:p>
@@ -4716,7 +4709,7 @@
               <a:tabLst/>
               <a:defRPr/>
             </a:pPr>
-            <a:endParaRPr kumimoji="0" lang="en-US" altLang="ko-KR" sz="2398" b="0" i="0" u="none" strike="noStrike" kern="1200" cap="none" spc="0" normalizeH="0" baseline="0" noProof="0">
+            <a:endParaRPr kumimoji="0" lang="en-US" altLang="ko-KR" sz="2398" b="0" i="0" u="none" strike="noStrike" kern="1200" cap="none" spc="0" normalizeH="0" baseline="0" noProof="0" dirty="0">
               <a:ln>
                 <a:noFill/>
               </a:ln>
@@ -4791,7 +4784,7 @@
               <a:tabLst/>
               <a:defRPr/>
             </a:pPr>
-            <a:endParaRPr kumimoji="0" lang="en-US" altLang="ko-KR" sz="2398" b="0" i="0" u="none" strike="noStrike" kern="1200" cap="none" spc="0" normalizeH="0" baseline="0" noProof="0">
+            <a:endParaRPr kumimoji="0" lang="en-US" altLang="ko-KR" sz="2398" b="0" i="0" u="none" strike="noStrike" kern="1200" cap="none" spc="0" normalizeH="0" baseline="0" noProof="0" dirty="0">
               <a:ln>
                 <a:noFill/>
               </a:ln>
@@ -4872,7 +4865,7 @@
               <a:tabLst/>
               <a:defRPr/>
             </a:pPr>
-            <a:endParaRPr kumimoji="0" lang="en-US" altLang="ko-KR" sz="2398" b="0" i="0" u="none" strike="noStrike" kern="1200" cap="none" spc="0" normalizeH="0" baseline="0" noProof="0">
+            <a:endParaRPr kumimoji="0" lang="en-US" altLang="ko-KR" sz="2398" b="0" i="0" u="none" strike="noStrike" kern="1200" cap="none" spc="0" normalizeH="0" baseline="0" noProof="0" dirty="0">
               <a:ln>
                 <a:noFill/>
               </a:ln>
@@ -4953,7 +4946,7 @@
               <a:tabLst/>
               <a:defRPr/>
             </a:pPr>
-            <a:endParaRPr kumimoji="0" lang="en-US" altLang="ko-KR" sz="2398" b="0" i="0" u="none" strike="noStrike" kern="1200" cap="none" spc="0" normalizeH="0" baseline="0" noProof="0">
+            <a:endParaRPr kumimoji="0" lang="en-US" altLang="ko-KR" sz="2398" b="0" i="0" u="none" strike="noStrike" kern="1200" cap="none" spc="0" normalizeH="0" baseline="0" noProof="0" dirty="0">
               <a:ln>
                 <a:noFill/>
               </a:ln>
@@ -5157,7 +5150,7 @@
               <a:tabLst/>
               <a:defRPr/>
             </a:pPr>
-            <a:endParaRPr kumimoji="0" lang="en-US" altLang="ko-KR" sz="2398" b="0" i="0" u="none" strike="noStrike" kern="1200" cap="none" spc="0" normalizeH="0" baseline="0" noProof="0">
+            <a:endParaRPr kumimoji="0" lang="en-US" altLang="ko-KR" sz="2398" b="0" i="0" u="none" strike="noStrike" kern="1200" cap="none" spc="0" normalizeH="0" baseline="0" noProof="0" dirty="0">
               <a:ln>
                 <a:noFill/>
               </a:ln>
@@ -6663,7 +6656,7 @@
               <a:tabLst/>
               <a:defRPr/>
             </a:pPr>
-            <a:endParaRPr kumimoji="0" lang="en-US" altLang="ko-KR" sz="2398" b="0" i="0" u="none" strike="noStrike" kern="1200" cap="none" spc="0" normalizeH="0" baseline="0" noProof="0">
+            <a:endParaRPr kumimoji="0" lang="en-US" altLang="ko-KR" sz="2398" b="0" i="0" u="none" strike="noStrike" kern="1200" cap="none" spc="0" normalizeH="0" baseline="0" noProof="0" dirty="0">
               <a:ln>
                 <a:noFill/>
               </a:ln>
@@ -6991,7 +6984,7 @@
               <a:tabLst/>
               <a:defRPr/>
             </a:pPr>
-            <a:endParaRPr kumimoji="0" lang="en-US" altLang="ko-KR" sz="2398" b="0" i="0" u="none" strike="noStrike" kern="1200" cap="none" spc="0" normalizeH="0" baseline="0" noProof="0">
+            <a:endParaRPr kumimoji="0" lang="en-US" altLang="ko-KR" sz="2398" b="0" i="0" u="none" strike="noStrike" kern="1200" cap="none" spc="0" normalizeH="0" baseline="0" noProof="0" dirty="0">
               <a:ln>
                 <a:noFill/>
               </a:ln>
@@ -7161,7 +7154,7 @@
               <a:pPr/>
               <a:t>‹#›</a:t>
             </a:fld>
-            <a:endParaRPr lang="en-US" noProof="0"/>
+            <a:endParaRPr lang="en-US" noProof="0" dirty="0"/>
           </a:p>
         </p:txBody>
       </p:sp>
@@ -7356,7 +7349,7 @@
               <a:tabLst/>
               <a:defRPr/>
             </a:pPr>
-            <a:endParaRPr kumimoji="0" lang="en-US" altLang="ko-KR" sz="2398" b="0" i="0" u="none" strike="noStrike" kern="1200" cap="none" spc="0" normalizeH="0" baseline="0" noProof="0">
+            <a:endParaRPr kumimoji="0" lang="en-US" altLang="ko-KR" sz="2398" b="0" i="0" u="none" strike="noStrike" kern="1200" cap="none" spc="0" normalizeH="0" baseline="0" noProof="0" dirty="0">
               <a:ln>
                 <a:noFill/>
               </a:ln>
@@ -8617,7 +8610,7 @@
               <a:pPr/>
               <a:t>‹#›</a:t>
             </a:fld>
-            <a:endParaRPr lang="en-US" noProof="0"/>
+            <a:endParaRPr lang="en-US" noProof="0" dirty="0"/>
           </a:p>
         </p:txBody>
       </p:sp>
@@ -8685,7 +8678,7 @@
               <a:tabLst/>
               <a:defRPr/>
             </a:pPr>
-            <a:endParaRPr kumimoji="0" lang="en-US" altLang="ko-KR" sz="2398" b="0" i="0" u="none" strike="noStrike" kern="1200" cap="none" spc="0" normalizeH="0" baseline="0" noProof="0">
+            <a:endParaRPr kumimoji="0" lang="en-US" altLang="ko-KR" sz="2398" b="0" i="0" u="none" strike="noStrike" kern="1200" cap="none" spc="0" normalizeH="0" baseline="0" noProof="0" dirty="0">
               <a:ln>
                 <a:noFill/>
               </a:ln>
@@ -9053,7 +9046,7 @@
               <a:tabLst/>
               <a:defRPr/>
             </a:pPr>
-            <a:endParaRPr kumimoji="0" lang="en-US" altLang="ko-KR" sz="2398" b="0" i="0" u="none" strike="noStrike" kern="1200" cap="none" spc="0" normalizeH="0" baseline="0" noProof="0">
+            <a:endParaRPr kumimoji="0" lang="en-US" altLang="ko-KR" sz="2398" b="0" i="0" u="none" strike="noStrike" kern="1200" cap="none" spc="0" normalizeH="0" baseline="0" noProof="0" dirty="0">
               <a:ln>
                 <a:noFill/>
               </a:ln>
@@ -9705,7 +9698,7 @@
           <a:lstStyle/>
           <a:p>
             <a:r>
-              <a:rPr lang="en-US">
+              <a:rPr lang="en-US" dirty="0">
                 <a:hlinkClick r:id="rId3"/>
               </a:rPr>
               <a:t>https://softuni.bg</a:t>
@@ -10247,7 +10240,7 @@
               </a:buClr>
             </a:pPr>
             <a:r>
-              <a:rPr lang="bg-BG" sz="3400" b="1" dirty="0" err="1">
+              <a:rPr lang="bg-BG" sz="3400" b="1" dirty="0">
                 <a:solidFill>
                   <a:schemeClr val="bg1"/>
                 </a:solidFill>
@@ -10312,14 +10305,10 @@
           <a:p>
             <a:r>
               <a:rPr lang="bg-BG" sz="4000" b="1" dirty="0"/>
-              <a:t>Шаблони за създаване </a:t>
-            </a:r>
-            <a:r>
-              <a:rPr lang="bg-BG" sz="4000" b="1"/>
-              <a:t>– ц</a:t>
-            </a:r>
-            <a:r>
-              <a:rPr lang="bg-BG"/>
+              <a:t>Шаблони за създаване – ц</a:t>
+            </a:r>
+            <a:r>
+              <a:rPr lang="bg-BG" dirty="0"/>
               <a:t>ели</a:t>
             </a:r>
             <a:endParaRPr lang="en-US" dirty="0"/>
@@ -17391,12 +17380,8 @@
           <a:lstStyle/>
           <a:p>
             <a:r>
-              <a:rPr lang="bg-BG" dirty="0" err="1"/>
-              <a:t>Подсистемни</a:t>
-            </a:r>
-            <a:r>
               <a:rPr lang="bg-BG" dirty="0"/>
-              <a:t> класове</a:t>
+              <a:t>Подсистемни класове</a:t>
             </a:r>
             <a:endParaRPr lang="en-US" dirty="0"/>
           </a:p>
@@ -20901,20 +20886,12 @@
               <a:t> </a:t>
             </a:r>
             <a:r>
-              <a:rPr lang="bg-BG" sz="3400" b="1" dirty="0" err="1">
+              <a:rPr lang="bg-BG" sz="3400" b="1" dirty="0">
                 <a:solidFill>
                   <a:schemeClr val="bg1"/>
                 </a:solidFill>
               </a:rPr>
-              <a:t>енкапсулирането</a:t>
-            </a:r>
-            <a:r>
-              <a:rPr lang="bg-BG" sz="3400" b="1" dirty="0">
-                <a:solidFill>
-                  <a:schemeClr val="bg1"/>
-                </a:solidFill>
-              </a:rPr>
-              <a:t> на поведение</a:t>
+              <a:t>енкапсулирането на поведение</a:t>
             </a:r>
             <a:r>
               <a:rPr lang="en-US" sz="3400" b="1" dirty="0">
@@ -22729,7 +22706,7 @@
               <a:t>Обект, който </a:t>
             </a:r>
             <a:r>
-              <a:rPr lang="bg-BG" b="1" dirty="0" err="1">
+              <a:rPr lang="bg-BG" b="1" dirty="0">
                 <a:solidFill>
                   <a:schemeClr val="bg1"/>
                 </a:solidFill>
@@ -23002,7 +22979,7 @@
               <a:t>Позволява </a:t>
             </a:r>
             <a:r>
-              <a:rPr lang="bg-BG" b="1" dirty="0" err="1">
+              <a:rPr lang="bg-BG" b="1" dirty="0">
                 <a:solidFill>
                   <a:schemeClr val="bg1"/>
                 </a:solidFill>
@@ -25099,7 +25076,7 @@
               <a:t> </a:t>
             </a:r>
             <a:r>
-              <a:rPr lang="bg-BG" sz="3800" b="1" dirty="0" err="1">
+              <a:rPr lang="bg-BG" sz="3800" b="1" dirty="0">
                 <a:solidFill>
                   <a:schemeClr val="bg1"/>
                 </a:solidFill>
@@ -25484,7 +25461,7 @@
               <a:t>Позволява на подкласовете да </a:t>
             </a:r>
             <a:r>
-              <a:rPr lang="bg-BG" b="1" dirty="0" err="1">
+              <a:rPr lang="bg-BG" b="1" dirty="0">
                 <a:solidFill>
                   <a:schemeClr val="bg1"/>
                 </a:solidFill>
@@ -26864,7 +26841,7 @@
             <a:lstStyle/>
             <a:p>
               <a:pPr algn="ctr"/>
-              <a:endParaRPr lang="ko-KR" altLang="en-US" sz="2399">
+              <a:endParaRPr lang="ko-KR" altLang="en-US" sz="2399" dirty="0">
                 <a:solidFill>
                   <a:schemeClr val="bg1"/>
                 </a:solidFill>
@@ -26925,7 +26902,7 @@
             <a:lstStyle/>
             <a:p>
               <a:pPr algn="ctr"/>
-              <a:endParaRPr lang="ko-KR" altLang="en-US" sz="2399">
+              <a:endParaRPr lang="ko-KR" altLang="en-US" sz="2399" dirty="0">
                 <a:solidFill>
                   <a:schemeClr val="tx1"/>
                 </a:solidFill>
@@ -27884,7 +27861,7 @@
               <a:t>© </a:t>
             </a:r>
             <a:r>
-              <a:rPr lang="bg-BG" dirty="0" err="1"/>
+              <a:rPr lang="bg-BG" dirty="0"/>
               <a:t>СофтУни</a:t>
             </a:r>
             <a:r>
@@ -28163,7 +28140,7 @@
               </a:buClr>
             </a:pPr>
             <a:r>
-              <a:rPr lang="bg-BG" sz="3600" dirty="0" err="1"/>
+              <a:rPr lang="bg-BG" sz="3600" dirty="0"/>
               <a:t>Енкапсулация</a:t>
             </a:r>
             <a:r>
@@ -29170,7 +29147,7 @@
               <a:t>Разработчиците могат да изпитат </a:t>
             </a:r>
             <a:r>
-              <a:rPr lang="bg-BG" sz="3100" b="1" dirty="0" err="1">
+              <a:rPr lang="bg-BG" sz="3100" b="1" dirty="0">
                 <a:solidFill>
                   <a:schemeClr val="bg1"/>
                 </a:solidFill>
@@ -29345,7 +29322,7 @@
               <a:t> </a:t>
             </a:r>
             <a:r>
-              <a:rPr lang="bg-BG" sz="2800" b="1" dirty="0" err="1">
+              <a:rPr lang="bg-BG" sz="2800" b="1" dirty="0">
                 <a:solidFill>
                   <a:schemeClr val="bg1"/>
                 </a:solidFill>

</xml_diff>